<commit_message>
update to diagram content
</commit_message>
<xml_diff>
--- a/Diagram-Template.pptx
+++ b/Diagram-Template.pptx
@@ -63,8 +63,8 @@
         </p:nvSpPr>
         <p:spPr>
           <a:xfrm>
-            <a:off x="311760" y="744480"/>
-            <a:ext cx="8519400" cy="2051640"/>
+            <a:off x="457200" y="205200"/>
+            <a:ext cx="8229240" cy="858600"/>
           </a:xfrm>
           <a:prstGeom prst="rect">
             <a:avLst/>
@@ -90,8 +90,8 @@
         </p:nvSpPr>
         <p:spPr>
           <a:xfrm>
-            <a:off x="311760" y="2834280"/>
-            <a:ext cx="8519400" cy="377280"/>
+            <a:off x="457200" y="1203480"/>
+            <a:ext cx="8229240" cy="1422720"/>
           </a:xfrm>
           <a:prstGeom prst="rect">
             <a:avLst/>
@@ -116,8 +116,8 @@
         </p:nvSpPr>
         <p:spPr>
           <a:xfrm>
-            <a:off x="311760" y="3247920"/>
-            <a:ext cx="8519400" cy="377280"/>
+            <a:off x="457200" y="2761920"/>
+            <a:ext cx="8229240" cy="1422720"/>
           </a:xfrm>
           <a:prstGeom prst="rect">
             <a:avLst/>
@@ -164,8 +164,8 @@
         </p:nvSpPr>
         <p:spPr>
           <a:xfrm>
-            <a:off x="311760" y="744480"/>
-            <a:ext cx="8519400" cy="2051640"/>
+            <a:off x="457200" y="205200"/>
+            <a:ext cx="8229240" cy="858600"/>
           </a:xfrm>
           <a:prstGeom prst="rect">
             <a:avLst/>
@@ -191,8 +191,8 @@
         </p:nvSpPr>
         <p:spPr>
           <a:xfrm>
-            <a:off x="311760" y="2834280"/>
-            <a:ext cx="4157280" cy="377280"/>
+            <a:off x="457200" y="1203480"/>
+            <a:ext cx="4015800" cy="1422720"/>
           </a:xfrm>
           <a:prstGeom prst="rect">
             <a:avLst/>
@@ -217,8 +217,8 @@
         </p:nvSpPr>
         <p:spPr>
           <a:xfrm>
-            <a:off x="4677120" y="2834280"/>
-            <a:ext cx="4157280" cy="377280"/>
+            <a:off x="4674240" y="1203480"/>
+            <a:ext cx="4015800" cy="1422720"/>
           </a:xfrm>
           <a:prstGeom prst="rect">
             <a:avLst/>
@@ -243,8 +243,8 @@
         </p:nvSpPr>
         <p:spPr>
           <a:xfrm>
-            <a:off x="4677120" y="3247920"/>
-            <a:ext cx="4157280" cy="377280"/>
+            <a:off x="4674240" y="2761920"/>
+            <a:ext cx="4015800" cy="1422720"/>
           </a:xfrm>
           <a:prstGeom prst="rect">
             <a:avLst/>
@@ -269,8 +269,8 @@
         </p:nvSpPr>
         <p:spPr>
           <a:xfrm>
-            <a:off x="311760" y="3247920"/>
-            <a:ext cx="4157280" cy="377280"/>
+            <a:off x="457200" y="2761920"/>
+            <a:ext cx="4015800" cy="1422720"/>
           </a:xfrm>
           <a:prstGeom prst="rect">
             <a:avLst/>
@@ -317,8 +317,8 @@
         </p:nvSpPr>
         <p:spPr>
           <a:xfrm>
-            <a:off x="311760" y="744480"/>
-            <a:ext cx="8519400" cy="2051640"/>
+            <a:off x="457200" y="205200"/>
+            <a:ext cx="8229240" cy="858600"/>
           </a:xfrm>
           <a:prstGeom prst="rect">
             <a:avLst/>
@@ -344,8 +344,8 @@
         </p:nvSpPr>
         <p:spPr>
           <a:xfrm>
-            <a:off x="311760" y="2834280"/>
-            <a:ext cx="8519400" cy="791640"/>
+            <a:off x="457200" y="1203480"/>
+            <a:ext cx="8229240" cy="2982960"/>
           </a:xfrm>
           <a:prstGeom prst="rect">
             <a:avLst/>
@@ -370,8 +370,8 @@
         </p:nvSpPr>
         <p:spPr>
           <a:xfrm>
-            <a:off x="311760" y="2834280"/>
-            <a:ext cx="8519400" cy="791640"/>
+            <a:off x="457200" y="1203480"/>
+            <a:ext cx="8229240" cy="2982960"/>
           </a:xfrm>
           <a:prstGeom prst="rect">
             <a:avLst/>
@@ -396,8 +396,8 @@
         </p:blipFill>
         <p:spPr>
           <a:xfrm>
-            <a:off x="4075200" y="2833920"/>
-            <a:ext cx="992160" cy="791640"/>
+            <a:off x="2701800" y="1203480"/>
+            <a:ext cx="3739320" cy="2982960"/>
           </a:xfrm>
           <a:prstGeom prst="rect">
             <a:avLst/>
@@ -419,8 +419,8 @@
         </p:blipFill>
         <p:spPr>
           <a:xfrm>
-            <a:off x="4075200" y="2833920"/>
-            <a:ext cx="992160" cy="791640"/>
+            <a:off x="2701800" y="1203480"/>
+            <a:ext cx="3739320" cy="2982960"/>
           </a:xfrm>
           <a:prstGeom prst="rect">
             <a:avLst/>
@@ -464,8 +464,8 @@
         </p:nvSpPr>
         <p:spPr>
           <a:xfrm>
-            <a:off x="311760" y="744480"/>
-            <a:ext cx="8519400" cy="2051640"/>
+            <a:off x="457200" y="205200"/>
+            <a:ext cx="8229240" cy="858600"/>
           </a:xfrm>
           <a:prstGeom prst="rect">
             <a:avLst/>
@@ -491,8 +491,8 @@
         </p:nvSpPr>
         <p:spPr>
           <a:xfrm>
-            <a:off x="311760" y="2834280"/>
-            <a:ext cx="8519400" cy="791640"/>
+            <a:off x="457200" y="1203480"/>
+            <a:ext cx="8229240" cy="2982960"/>
           </a:xfrm>
           <a:prstGeom prst="rect">
             <a:avLst/>
@@ -540,8 +540,8 @@
         </p:nvSpPr>
         <p:spPr>
           <a:xfrm>
-            <a:off x="311760" y="744480"/>
-            <a:ext cx="8519400" cy="2051640"/>
+            <a:off x="457200" y="205200"/>
+            <a:ext cx="8229240" cy="858600"/>
           </a:xfrm>
           <a:prstGeom prst="rect">
             <a:avLst/>
@@ -567,8 +567,8 @@
         </p:nvSpPr>
         <p:spPr>
           <a:xfrm>
-            <a:off x="311760" y="2834280"/>
-            <a:ext cx="8519400" cy="791640"/>
+            <a:off x="457200" y="1203480"/>
+            <a:ext cx="8229240" cy="2982960"/>
           </a:xfrm>
           <a:prstGeom prst="rect">
             <a:avLst/>
@@ -615,8 +615,8 @@
         </p:nvSpPr>
         <p:spPr>
           <a:xfrm>
-            <a:off x="311760" y="744480"/>
-            <a:ext cx="8519400" cy="2051640"/>
+            <a:off x="457200" y="205200"/>
+            <a:ext cx="8229240" cy="858600"/>
           </a:xfrm>
           <a:prstGeom prst="rect">
             <a:avLst/>
@@ -642,8 +642,8 @@
         </p:nvSpPr>
         <p:spPr>
           <a:xfrm>
-            <a:off x="311760" y="2834280"/>
-            <a:ext cx="4157280" cy="791640"/>
+            <a:off x="457200" y="1203480"/>
+            <a:ext cx="4015800" cy="2982960"/>
           </a:xfrm>
           <a:prstGeom prst="rect">
             <a:avLst/>
@@ -668,8 +668,8 @@
         </p:nvSpPr>
         <p:spPr>
           <a:xfrm>
-            <a:off x="4677120" y="2834280"/>
-            <a:ext cx="4157280" cy="791640"/>
+            <a:off x="4674240" y="1203480"/>
+            <a:ext cx="4015800" cy="2982960"/>
           </a:xfrm>
           <a:prstGeom prst="rect">
             <a:avLst/>
@@ -716,8 +716,8 @@
         </p:nvSpPr>
         <p:spPr>
           <a:xfrm>
-            <a:off x="311760" y="744480"/>
-            <a:ext cx="8519400" cy="2051640"/>
+            <a:off x="457200" y="205200"/>
+            <a:ext cx="8229240" cy="858600"/>
           </a:xfrm>
           <a:prstGeom prst="rect">
             <a:avLst/>
@@ -765,8 +765,8 @@
         </p:nvSpPr>
         <p:spPr>
           <a:xfrm>
-            <a:off x="311760" y="744480"/>
-            <a:ext cx="8519400" cy="9511560"/>
+            <a:off x="457200" y="205200"/>
+            <a:ext cx="8229240" cy="3981240"/>
           </a:xfrm>
           <a:prstGeom prst="rect">
             <a:avLst/>
@@ -814,8 +814,8 @@
         </p:nvSpPr>
         <p:spPr>
           <a:xfrm>
-            <a:off x="311760" y="744480"/>
-            <a:ext cx="8519400" cy="2051640"/>
+            <a:off x="457200" y="205200"/>
+            <a:ext cx="8229240" cy="858600"/>
           </a:xfrm>
           <a:prstGeom prst="rect">
             <a:avLst/>
@@ -841,8 +841,8 @@
         </p:nvSpPr>
         <p:spPr>
           <a:xfrm>
-            <a:off x="311760" y="2834280"/>
-            <a:ext cx="4157280" cy="377280"/>
+            <a:off x="457200" y="1203480"/>
+            <a:ext cx="4015800" cy="1422720"/>
           </a:xfrm>
           <a:prstGeom prst="rect">
             <a:avLst/>
@@ -867,8 +867,8 @@
         </p:nvSpPr>
         <p:spPr>
           <a:xfrm>
-            <a:off x="311760" y="3247920"/>
-            <a:ext cx="4157280" cy="377280"/>
+            <a:off x="457200" y="2761920"/>
+            <a:ext cx="4015800" cy="1422720"/>
           </a:xfrm>
           <a:prstGeom prst="rect">
             <a:avLst/>
@@ -893,8 +893,8 @@
         </p:nvSpPr>
         <p:spPr>
           <a:xfrm>
-            <a:off x="4677120" y="2834280"/>
-            <a:ext cx="4157280" cy="791640"/>
+            <a:off x="4674240" y="1203480"/>
+            <a:ext cx="4015800" cy="2982960"/>
           </a:xfrm>
           <a:prstGeom prst="rect">
             <a:avLst/>
@@ -941,8 +941,8 @@
         </p:nvSpPr>
         <p:spPr>
           <a:xfrm>
-            <a:off x="311760" y="744480"/>
-            <a:ext cx="8519400" cy="2051640"/>
+            <a:off x="457200" y="205200"/>
+            <a:ext cx="8229240" cy="858600"/>
           </a:xfrm>
           <a:prstGeom prst="rect">
             <a:avLst/>
@@ -968,8 +968,8 @@
         </p:nvSpPr>
         <p:spPr>
           <a:xfrm>
-            <a:off x="311760" y="2834280"/>
-            <a:ext cx="4157280" cy="791640"/>
+            <a:off x="457200" y="1203480"/>
+            <a:ext cx="4015800" cy="2982960"/>
           </a:xfrm>
           <a:prstGeom prst="rect">
             <a:avLst/>
@@ -994,8 +994,8 @@
         </p:nvSpPr>
         <p:spPr>
           <a:xfrm>
-            <a:off x="4677120" y="2834280"/>
-            <a:ext cx="4157280" cy="377280"/>
+            <a:off x="4674240" y="1203480"/>
+            <a:ext cx="4015800" cy="1422720"/>
           </a:xfrm>
           <a:prstGeom prst="rect">
             <a:avLst/>
@@ -1020,8 +1020,8 @@
         </p:nvSpPr>
         <p:spPr>
           <a:xfrm>
-            <a:off x="4677120" y="3247920"/>
-            <a:ext cx="4157280" cy="377280"/>
+            <a:off x="4674240" y="2761920"/>
+            <a:ext cx="4015800" cy="1422720"/>
           </a:xfrm>
           <a:prstGeom prst="rect">
             <a:avLst/>
@@ -1068,8 +1068,8 @@
         </p:nvSpPr>
         <p:spPr>
           <a:xfrm>
-            <a:off x="311760" y="744480"/>
-            <a:ext cx="8519400" cy="2051640"/>
+            <a:off x="457200" y="205200"/>
+            <a:ext cx="8229240" cy="858600"/>
           </a:xfrm>
           <a:prstGeom prst="rect">
             <a:avLst/>
@@ -1095,8 +1095,8 @@
         </p:nvSpPr>
         <p:spPr>
           <a:xfrm>
-            <a:off x="311760" y="2834280"/>
-            <a:ext cx="4157280" cy="377280"/>
+            <a:off x="457200" y="1203480"/>
+            <a:ext cx="4015800" cy="1422720"/>
           </a:xfrm>
           <a:prstGeom prst="rect">
             <a:avLst/>
@@ -1121,8 +1121,8 @@
         </p:nvSpPr>
         <p:spPr>
           <a:xfrm>
-            <a:off x="4677120" y="2834280"/>
-            <a:ext cx="4157280" cy="377280"/>
+            <a:off x="4674240" y="1203480"/>
+            <a:ext cx="4015800" cy="1422720"/>
           </a:xfrm>
           <a:prstGeom prst="rect">
             <a:avLst/>
@@ -1147,8 +1147,8 @@
         </p:nvSpPr>
         <p:spPr>
           <a:xfrm>
-            <a:off x="311760" y="3247920"/>
-            <a:ext cx="8519400" cy="377280"/>
+            <a:off x="457200" y="2761920"/>
+            <a:ext cx="8229240" cy="1422720"/>
           </a:xfrm>
           <a:prstGeom prst="rect">
             <a:avLst/>
@@ -1202,8 +1202,8 @@
         </p:nvSpPr>
         <p:spPr>
           <a:xfrm>
-            <a:off x="311760" y="744480"/>
-            <a:ext cx="8519400" cy="2051640"/>
+            <a:off x="457200" y="205200"/>
+            <a:ext cx="8229240" cy="858600"/>
           </a:xfrm>
           <a:prstGeom prst="rect">
             <a:avLst/>
@@ -1213,6 +1213,12 @@
           <a:bodyPr lIns="0" rIns="0" tIns="0" bIns="0" anchor="ctr"/>
           <a:p>
             <a:pPr algn="ctr"/>
+            <a:r>
+              <a:rPr lang="en-US" sz="4400" spc="-1">
+                <a:latin typeface="Arial"/>
+              </a:rPr>
+              <a:t>Click to edit the title text format</a:t>
+            </a:r>
             <a:endParaRPr/>
           </a:p>
         </p:txBody>
@@ -1229,8 +1235,8 @@
         </p:nvSpPr>
         <p:spPr>
           <a:xfrm>
-            <a:off x="311760" y="2834280"/>
-            <a:ext cx="8519400" cy="791640"/>
+            <a:off x="457200" y="1203480"/>
+            <a:ext cx="8229240" cy="2982960"/>
           </a:xfrm>
           <a:prstGeom prst="rect">
             <a:avLst/>
@@ -1248,7 +1254,7 @@
               <a:buChar char=""/>
             </a:pPr>
             <a:r>
-              <a:rPr lang="en-US" sz="1800" spc="-1">
+              <a:rPr lang="en-US" sz="3200" spc="-1">
                 <a:latin typeface="Arial"/>
               </a:rPr>
               <a:t>Click to edit the outline text format</a:t>
@@ -1265,7 +1271,7 @@
               <a:buChar char=""/>
             </a:pPr>
             <a:r>
-              <a:rPr lang="en-US" sz="1800" spc="-1">
+              <a:rPr lang="en-US" sz="2800" spc="-1">
                 <a:latin typeface="Arial"/>
               </a:rPr>
               <a:t>Second Outline Level</a:t>
@@ -1282,7 +1288,7 @@
               <a:buChar char=""/>
             </a:pPr>
             <a:r>
-              <a:rPr lang="en-US" sz="1800" spc="-1">
+              <a:rPr lang="en-US" sz="2400" spc="-1">
                 <a:latin typeface="Arial"/>
               </a:rPr>
               <a:t>Third Outline Level</a:t>
@@ -1299,7 +1305,7 @@
               <a:buChar char=""/>
             </a:pPr>
             <a:r>
-              <a:rPr lang="en-US" sz="1800" spc="-1">
+              <a:rPr lang="en-US" sz="2000" spc="-1">
                 <a:latin typeface="Arial"/>
               </a:rPr>
               <a:t>Fourth Outline Level</a:t>
@@ -1316,7 +1322,7 @@
               <a:buChar char=""/>
             </a:pPr>
             <a:r>
-              <a:rPr lang="en-US" sz="1800" spc="-1">
+              <a:rPr lang="en-US" sz="2000" spc="-1">
                 <a:latin typeface="Arial"/>
               </a:rPr>
               <a:t>Fifth Outline Level</a:t>
@@ -1333,7 +1339,7 @@
               <a:buChar char=""/>
             </a:pPr>
             <a:r>
-              <a:rPr lang="en-US" sz="1800" spc="-1">
+              <a:rPr lang="en-US" sz="2000" spc="-1">
                 <a:latin typeface="Arial"/>
               </a:rPr>
               <a:t>Sixth Outline Level</a:t>
@@ -1350,7 +1356,7 @@
               <a:buChar char=""/>
             </a:pPr>
             <a:r>
-              <a:rPr lang="en-US" sz="1800" spc="-1">
+              <a:rPr lang="en-US" sz="2000" spc="-1">
                 <a:latin typeface="Arial"/>
               </a:rPr>
               <a:t>Seventh Outline Level</a:t>
@@ -1405,7 +1411,7 @@
         <p:spPr>
           <a:xfrm>
             <a:off x="3587760" y="184320"/>
-            <a:ext cx="5613840" cy="5108400"/>
+            <a:ext cx="5613480" cy="5108040"/>
           </a:xfrm>
           <a:prstGeom prst="ellipse">
             <a:avLst/>
@@ -1476,8 +1482,8 @@
         </p:nvSpPr>
         <p:spPr>
           <a:xfrm>
-            <a:off x="0" y="0"/>
-            <a:ext cx="5108040" cy="5108040"/>
+            <a:off x="70200" y="0"/>
+            <a:ext cx="5107680" cy="5107680"/>
           </a:xfrm>
           <a:prstGeom prst="ellipse">
             <a:avLst/>
@@ -1570,7 +1576,7 @@
                 <a:latin typeface="Arial"/>
                 <a:ea typeface="DejaVu Sans"/>
               </a:rPr>
-              <a:t>Merg capture files</a:t>
+              <a:t>Merge capture files</a:t>
             </a:r>
             <a:endParaRPr/>
           </a:p>
@@ -1609,7 +1615,7 @@
         <p:spPr>
           <a:xfrm>
             <a:off x="1309320" y="171000"/>
-            <a:ext cx="1689480" cy="824760"/>
+            <a:ext cx="1689120" cy="824400"/>
           </a:xfrm>
           <a:prstGeom prst="rect">
             <a:avLst/>
@@ -1661,7 +1667,7 @@
         <p:spPr>
           <a:xfrm>
             <a:off x="5806080" y="205920"/>
-            <a:ext cx="1161360" cy="824760"/>
+            <a:ext cx="1161000" cy="824400"/>
           </a:xfrm>
           <a:prstGeom prst="rect">
             <a:avLst/>
@@ -1713,7 +1719,7 @@
         <p:spPr>
           <a:xfrm>
             <a:off x="3915000" y="1366560"/>
-            <a:ext cx="1119240" cy="468720"/>
+            <a:ext cx="1118880" cy="468360"/>
           </a:xfrm>
           <a:prstGeom prst="rect">
             <a:avLst/>
@@ -1739,7 +1745,7 @@
         <p:spPr>
           <a:xfrm>
             <a:off x="1539720" y="1574280"/>
-            <a:ext cx="2776680" cy="399240"/>
+            <a:ext cx="2776320" cy="398880"/>
           </a:xfrm>
           <a:prstGeom prst="rect">
             <a:avLst/>
@@ -1765,7 +1771,7 @@
         <p:spPr>
           <a:xfrm>
             <a:off x="1084320" y="1149840"/>
-            <a:ext cx="2776680" cy="352800"/>
+            <a:ext cx="2776320" cy="352440"/>
           </a:xfrm>
           <a:prstGeom prst="rect">
             <a:avLst/>
@@ -1791,7 +1797,7 @@
         <p:spPr>
           <a:xfrm>
             <a:off x="3940200" y="1836360"/>
-            <a:ext cx="1069200" cy="337680"/>
+            <a:ext cx="1068840" cy="337320"/>
           </a:xfrm>
           <a:prstGeom prst="rect">
             <a:avLst/>
@@ -1817,7 +1823,7 @@
         <p:spPr>
           <a:xfrm>
             <a:off x="4998240" y="1149840"/>
-            <a:ext cx="2776680" cy="352800"/>
+            <a:ext cx="2776320" cy="352440"/>
           </a:xfrm>
           <a:prstGeom prst="rect">
             <a:avLst/>
@@ -1833,6 +1839,48 @@
           <a:effectRef idx="0"/>
           <a:fontRef idx="minor"/>
         </p:style>
+        <p:txBody>
+          <a:bodyPr lIns="90000" rIns="90000" tIns="45000" bIns="45000"/>
+          <a:p>
+            <a:r>
+              <a:rPr lang="en-US" sz="1800" spc="-1">
+                <a:latin typeface="Arial"/>
+              </a:rPr>
+              <a:t>- Peforms faster captures thank wireshark</a:t>
+            </a:r>
+            <a:endParaRPr/>
+          </a:p>
+          <a:p>
+            <a:r>
+              <a:rPr lang="en-US" sz="1800" spc="-1">
+                <a:latin typeface="Arial"/>
+              </a:rPr>
+              <a:t>- can script tcpdump for further efficiency.</a:t>
+            </a:r>
+            <a:endParaRPr/>
+          </a:p>
+          <a:p>
+            <a:r>
+              <a:rPr lang="en-US" sz="1800" spc="-1">
+                <a:latin typeface="Arial"/>
+              </a:rPr>
+              <a:t>- provides accurate date and time stamps</a:t>
+            </a:r>
+            <a:endParaRPr/>
+          </a:p>
+          <a:p>
+            <a:r>
+              <a:rPr lang="en-US" sz="1800" spc="-1">
+                <a:latin typeface="Arial"/>
+              </a:rPr>
+              <a:t>- text based output.</a:t>
+            </a:r>
+            <a:endParaRPr/>
+          </a:p>
+          <a:p>
+            <a:endParaRPr/>
+          </a:p>
+        </p:txBody>
       </p:sp>
       <p:sp>
         <p:nvSpPr>
@@ -1843,7 +1891,7 @@
         <p:spPr>
           <a:xfrm>
             <a:off x="3638880" y="541080"/>
-            <a:ext cx="1428480" cy="3891240"/>
+            <a:ext cx="1428120" cy="3890880"/>
           </a:xfrm>
           <a:prstGeom prst="ellipse">
             <a:avLst/>

</xml_diff>